<commit_message>
final updates to plots: letters on outside
</commit_message>
<xml_diff>
--- a/03_plots/Fig3polished.pptx
+++ b/03_plots/Fig3polished.pptx
@@ -6,7 +6,8 @@
   </p:sldMasterIdLst>
   <p:sldIdLst>
     <p:sldId id="256" r:id="rId2"/>
-    <p:sldId id="259" r:id="rId3"/>
+    <p:sldId id="260" r:id="rId3"/>
+    <p:sldId id="259" r:id="rId4"/>
   </p:sldIdLst>
   <p:sldSz cx="12192000" cy="6858000"/>
   <p:notesSz cx="6858000" cy="9144000"/>
@@ -260,7 +261,7 @@
           <a:p>
             <a:fld id="{4519F51E-EEAC-3645-B22B-B9AA262C15CB}" type="datetimeFigureOut">
               <a:rPr lang="en-US" smtClean="0"/>
-              <a:t>1/7/21</a:t>
+              <a:t>3/2/21</a:t>
             </a:fld>
             <a:endParaRPr lang="en-US"/>
           </a:p>
@@ -458,7 +459,7 @@
           <a:p>
             <a:fld id="{4519F51E-EEAC-3645-B22B-B9AA262C15CB}" type="datetimeFigureOut">
               <a:rPr lang="en-US" smtClean="0"/>
-              <a:t>1/7/21</a:t>
+              <a:t>3/2/21</a:t>
             </a:fld>
             <a:endParaRPr lang="en-US"/>
           </a:p>
@@ -666,7 +667,7 @@
           <a:p>
             <a:fld id="{4519F51E-EEAC-3645-B22B-B9AA262C15CB}" type="datetimeFigureOut">
               <a:rPr lang="en-US" smtClean="0"/>
-              <a:t>1/7/21</a:t>
+              <a:t>3/2/21</a:t>
             </a:fld>
             <a:endParaRPr lang="en-US"/>
           </a:p>
@@ -864,7 +865,7 @@
           <a:p>
             <a:fld id="{4519F51E-EEAC-3645-B22B-B9AA262C15CB}" type="datetimeFigureOut">
               <a:rPr lang="en-US" smtClean="0"/>
-              <a:t>1/7/21</a:t>
+              <a:t>3/2/21</a:t>
             </a:fld>
             <a:endParaRPr lang="en-US"/>
           </a:p>
@@ -1139,7 +1140,7 @@
           <a:p>
             <a:fld id="{4519F51E-EEAC-3645-B22B-B9AA262C15CB}" type="datetimeFigureOut">
               <a:rPr lang="en-US" smtClean="0"/>
-              <a:t>1/7/21</a:t>
+              <a:t>3/2/21</a:t>
             </a:fld>
             <a:endParaRPr lang="en-US"/>
           </a:p>
@@ -1404,7 +1405,7 @@
           <a:p>
             <a:fld id="{4519F51E-EEAC-3645-B22B-B9AA262C15CB}" type="datetimeFigureOut">
               <a:rPr lang="en-US" smtClean="0"/>
-              <a:t>1/7/21</a:t>
+              <a:t>3/2/21</a:t>
             </a:fld>
             <a:endParaRPr lang="en-US"/>
           </a:p>
@@ -1816,7 +1817,7 @@
           <a:p>
             <a:fld id="{4519F51E-EEAC-3645-B22B-B9AA262C15CB}" type="datetimeFigureOut">
               <a:rPr lang="en-US" smtClean="0"/>
-              <a:t>1/7/21</a:t>
+              <a:t>3/2/21</a:t>
             </a:fld>
             <a:endParaRPr lang="en-US"/>
           </a:p>
@@ -1957,7 +1958,7 @@
           <a:p>
             <a:fld id="{4519F51E-EEAC-3645-B22B-B9AA262C15CB}" type="datetimeFigureOut">
               <a:rPr lang="en-US" smtClean="0"/>
-              <a:t>1/7/21</a:t>
+              <a:t>3/2/21</a:t>
             </a:fld>
             <a:endParaRPr lang="en-US"/>
           </a:p>
@@ -2070,7 +2071,7 @@
           <a:p>
             <a:fld id="{4519F51E-EEAC-3645-B22B-B9AA262C15CB}" type="datetimeFigureOut">
               <a:rPr lang="en-US" smtClean="0"/>
-              <a:t>1/7/21</a:t>
+              <a:t>3/2/21</a:t>
             </a:fld>
             <a:endParaRPr lang="en-US"/>
           </a:p>
@@ -2381,7 +2382,7 @@
           <a:p>
             <a:fld id="{4519F51E-EEAC-3645-B22B-B9AA262C15CB}" type="datetimeFigureOut">
               <a:rPr lang="en-US" smtClean="0"/>
-              <a:t>1/7/21</a:t>
+              <a:t>3/2/21</a:t>
             </a:fld>
             <a:endParaRPr lang="en-US"/>
           </a:p>
@@ -2669,7 +2670,7 @@
           <a:p>
             <a:fld id="{4519F51E-EEAC-3645-B22B-B9AA262C15CB}" type="datetimeFigureOut">
               <a:rPr lang="en-US" smtClean="0"/>
-              <a:t>1/7/21</a:t>
+              <a:t>3/2/21</a:t>
             </a:fld>
             <a:endParaRPr lang="en-US"/>
           </a:p>
@@ -2910,7 +2911,7 @@
           <a:p>
             <a:fld id="{4519F51E-EEAC-3645-B22B-B9AA262C15CB}" type="datetimeFigureOut">
               <a:rPr lang="en-US" smtClean="0"/>
-              <a:t>1/7/21</a:t>
+              <a:t>3/2/21</a:t>
             </a:fld>
             <a:endParaRPr lang="en-US"/>
           </a:p>
@@ -3329,10 +3330,10 @@
       </p:grpSpPr>
       <p:pic>
         <p:nvPicPr>
-          <p:cNvPr id="4" name="Picture 3">
-            <a:extLst>
-              <a:ext uri="{FF2B5EF4-FFF2-40B4-BE49-F238E27FC236}">
-                <a16:creationId xmlns:a16="http://schemas.microsoft.com/office/drawing/2014/main" id="{FF5D82B8-F305-784F-87F7-B808ADA53C74}"/>
+          <p:cNvPr id="3" name="Picture 2">
+            <a:extLst>
+              <a:ext uri="{FF2B5EF4-FFF2-40B4-BE49-F238E27FC236}">
+                <a16:creationId xmlns:a16="http://schemas.microsoft.com/office/drawing/2014/main" id="{F2833ED8-5D7F-FA4C-882A-B9163245792A}"/>
               </a:ext>
             </a:extLst>
           </p:cNvPr>
@@ -3825,6 +3826,520 @@
 </file>
 
 <file path=ppt/slides/slide2.xml><?xml version="1.0" encoding="utf-8"?>
+<p:sld xmlns:a="http://schemas.openxmlformats.org/drawingml/2006/main" xmlns:r="http://schemas.openxmlformats.org/officeDocument/2006/relationships" xmlns:p="http://schemas.openxmlformats.org/presentationml/2006/main">
+  <p:cSld>
+    <p:spTree>
+      <p:nvGrpSpPr>
+        <p:cNvPr id="1" name=""/>
+        <p:cNvGrpSpPr/>
+        <p:nvPr/>
+      </p:nvGrpSpPr>
+      <p:grpSpPr>
+        <a:xfrm>
+          <a:off x="0" y="0"/>
+          <a:ext cx="0" cy="0"/>
+          <a:chOff x="0" y="0"/>
+          <a:chExt cx="0" cy="0"/>
+        </a:xfrm>
+      </p:grpSpPr>
+      <p:pic>
+        <p:nvPicPr>
+          <p:cNvPr id="4" name="Picture 3">
+            <a:extLst>
+              <a:ext uri="{FF2B5EF4-FFF2-40B4-BE49-F238E27FC236}">
+                <a16:creationId xmlns:a16="http://schemas.microsoft.com/office/drawing/2014/main" id="{FF5D82B8-F305-784F-87F7-B808ADA53C74}"/>
+              </a:ext>
+            </a:extLst>
+          </p:cNvPr>
+          <p:cNvPicPr>
+            <a:picLocks noChangeAspect="1"/>
+          </p:cNvPicPr>
+          <p:nvPr/>
+        </p:nvPicPr>
+        <p:blipFill>
+          <a:blip r:embed="rId2"/>
+          <a:stretch>
+            <a:fillRect/>
+          </a:stretch>
+        </p:blipFill>
+        <p:spPr>
+          <a:xfrm>
+            <a:off x="1524000" y="0"/>
+            <a:ext cx="9144000" cy="6858000"/>
+          </a:xfrm>
+          <a:prstGeom prst="rect">
+            <a:avLst/>
+          </a:prstGeom>
+        </p:spPr>
+      </p:pic>
+      <p:sp>
+        <p:nvSpPr>
+          <p:cNvPr id="6" name="Rectangle 5">
+            <a:extLst>
+              <a:ext uri="{FF2B5EF4-FFF2-40B4-BE49-F238E27FC236}">
+                <a16:creationId xmlns:a16="http://schemas.microsoft.com/office/drawing/2014/main" id="{CB6B0F10-19BE-194A-944C-133BDE1350FB}"/>
+              </a:ext>
+            </a:extLst>
+          </p:cNvPr>
+          <p:cNvSpPr/>
+          <p:nvPr/>
+        </p:nvSpPr>
+        <p:spPr>
+          <a:xfrm>
+            <a:off x="10099675" y="4629150"/>
+            <a:ext cx="438150" cy="133350"/>
+          </a:xfrm>
+          <a:prstGeom prst="rect">
+            <a:avLst/>
+          </a:prstGeom>
+          <a:solidFill>
+            <a:schemeClr val="bg1"/>
+          </a:solidFill>
+          <a:ln>
+            <a:noFill/>
+          </a:ln>
+        </p:spPr>
+        <p:style>
+          <a:lnRef idx="2">
+            <a:schemeClr val="accent1">
+              <a:shade val="50000"/>
+            </a:schemeClr>
+          </a:lnRef>
+          <a:fillRef idx="1">
+            <a:schemeClr val="accent1"/>
+          </a:fillRef>
+          <a:effectRef idx="0">
+            <a:schemeClr val="accent1"/>
+          </a:effectRef>
+          <a:fontRef idx="minor">
+            <a:schemeClr val="lt1"/>
+          </a:fontRef>
+        </p:style>
+        <p:txBody>
+          <a:bodyPr rtlCol="0" anchor="ctr"/>
+          <a:lstStyle/>
+          <a:p>
+            <a:pPr algn="ctr"/>
+            <a:endParaRPr lang="en-US"/>
+          </a:p>
+        </p:txBody>
+      </p:sp>
+      <p:sp>
+        <p:nvSpPr>
+          <p:cNvPr id="5" name="TextBox 4">
+            <a:extLst>
+              <a:ext uri="{FF2B5EF4-FFF2-40B4-BE49-F238E27FC236}">
+                <a16:creationId xmlns:a16="http://schemas.microsoft.com/office/drawing/2014/main" id="{4C641871-44DF-7548-AA37-2C8C49EDEE01}"/>
+              </a:ext>
+            </a:extLst>
+          </p:cNvPr>
+          <p:cNvSpPr txBox="1"/>
+          <p:nvPr/>
+        </p:nvSpPr>
+        <p:spPr>
+          <a:xfrm>
+            <a:off x="10015350" y="4562579"/>
+            <a:ext cx="630425" cy="238527"/>
+          </a:xfrm>
+          <a:prstGeom prst="rect">
+            <a:avLst/>
+          </a:prstGeom>
+          <a:noFill/>
+        </p:spPr>
+        <p:txBody>
+          <a:bodyPr wrap="square" rtlCol="0">
+            <a:spAutoFit/>
+          </a:bodyPr>
+          <a:lstStyle/>
+          <a:p>
+            <a:r>
+              <a:rPr lang="en-US" sz="950" b="1" dirty="0">
+                <a:latin typeface="Arial" panose="020B0604020202020204" pitchFamily="34" charset="0"/>
+                <a:cs typeface="Arial" panose="020B0604020202020204" pitchFamily="34" charset="0"/>
+              </a:rPr>
+              <a:t>Pup/m</a:t>
+            </a:r>
+            <a:r>
+              <a:rPr lang="en-US" sz="950" b="1" baseline="30000" dirty="0">
+                <a:latin typeface="Arial" panose="020B0604020202020204" pitchFamily="34" charset="0"/>
+                <a:cs typeface="Arial" panose="020B0604020202020204" pitchFamily="34" charset="0"/>
+              </a:rPr>
+              <a:t>2</a:t>
+            </a:r>
+          </a:p>
+        </p:txBody>
+      </p:sp>
+      <p:sp>
+        <p:nvSpPr>
+          <p:cNvPr id="10" name="Rectangle 9">
+            <a:extLst>
+              <a:ext uri="{FF2B5EF4-FFF2-40B4-BE49-F238E27FC236}">
+                <a16:creationId xmlns:a16="http://schemas.microsoft.com/office/drawing/2014/main" id="{32635A4B-99A7-C742-BDE8-8E962AD53877}"/>
+              </a:ext>
+            </a:extLst>
+          </p:cNvPr>
+          <p:cNvSpPr/>
+          <p:nvPr/>
+        </p:nvSpPr>
+        <p:spPr>
+          <a:xfrm>
+            <a:off x="10099675" y="4175124"/>
+            <a:ext cx="438150" cy="133350"/>
+          </a:xfrm>
+          <a:prstGeom prst="rect">
+            <a:avLst/>
+          </a:prstGeom>
+          <a:solidFill>
+            <a:schemeClr val="bg1"/>
+          </a:solidFill>
+          <a:ln>
+            <a:noFill/>
+          </a:ln>
+        </p:spPr>
+        <p:style>
+          <a:lnRef idx="2">
+            <a:schemeClr val="accent1">
+              <a:shade val="50000"/>
+            </a:schemeClr>
+          </a:lnRef>
+          <a:fillRef idx="1">
+            <a:schemeClr val="accent1"/>
+          </a:fillRef>
+          <a:effectRef idx="0">
+            <a:schemeClr val="accent1"/>
+          </a:effectRef>
+          <a:fontRef idx="minor">
+            <a:schemeClr val="lt1"/>
+          </a:fontRef>
+        </p:style>
+        <p:txBody>
+          <a:bodyPr rtlCol="0" anchor="ctr"/>
+          <a:lstStyle/>
+          <a:p>
+            <a:pPr algn="ctr"/>
+            <a:endParaRPr lang="en-US"/>
+          </a:p>
+        </p:txBody>
+      </p:sp>
+      <p:sp>
+        <p:nvSpPr>
+          <p:cNvPr id="12" name="Rectangle 11">
+            <a:extLst>
+              <a:ext uri="{FF2B5EF4-FFF2-40B4-BE49-F238E27FC236}">
+                <a16:creationId xmlns:a16="http://schemas.microsoft.com/office/drawing/2014/main" id="{B1F2ED2C-E375-334F-B196-F1040020F62D}"/>
+              </a:ext>
+            </a:extLst>
+          </p:cNvPr>
+          <p:cNvSpPr/>
+          <p:nvPr/>
+        </p:nvSpPr>
+        <p:spPr>
+          <a:xfrm>
+            <a:off x="10173247" y="5957992"/>
+            <a:ext cx="438150" cy="133350"/>
+          </a:xfrm>
+          <a:prstGeom prst="rect">
+            <a:avLst/>
+          </a:prstGeom>
+          <a:solidFill>
+            <a:schemeClr val="bg1"/>
+          </a:solidFill>
+          <a:ln>
+            <a:noFill/>
+          </a:ln>
+        </p:spPr>
+        <p:style>
+          <a:lnRef idx="2">
+            <a:schemeClr val="accent1">
+              <a:shade val="50000"/>
+            </a:schemeClr>
+          </a:lnRef>
+          <a:fillRef idx="1">
+            <a:schemeClr val="accent1"/>
+          </a:fillRef>
+          <a:effectRef idx="0">
+            <a:schemeClr val="accent1"/>
+          </a:effectRef>
+          <a:fontRef idx="minor">
+            <a:schemeClr val="lt1"/>
+          </a:fontRef>
+        </p:style>
+        <p:txBody>
+          <a:bodyPr rtlCol="0" anchor="ctr"/>
+          <a:lstStyle/>
+          <a:p>
+            <a:pPr algn="ctr"/>
+            <a:endParaRPr lang="en-US"/>
+          </a:p>
+        </p:txBody>
+      </p:sp>
+      <p:sp>
+        <p:nvSpPr>
+          <p:cNvPr id="11" name="TextBox 10">
+            <a:extLst>
+              <a:ext uri="{FF2B5EF4-FFF2-40B4-BE49-F238E27FC236}">
+                <a16:creationId xmlns:a16="http://schemas.microsoft.com/office/drawing/2014/main" id="{6170155B-30D4-EA49-955D-76E5AA8AA4C8}"/>
+              </a:ext>
+            </a:extLst>
+          </p:cNvPr>
+          <p:cNvSpPr txBox="1"/>
+          <p:nvPr/>
+        </p:nvSpPr>
+        <p:spPr>
+          <a:xfrm>
+            <a:off x="10099675" y="5900053"/>
+            <a:ext cx="630425" cy="238527"/>
+          </a:xfrm>
+          <a:prstGeom prst="rect">
+            <a:avLst/>
+          </a:prstGeom>
+          <a:noFill/>
+        </p:spPr>
+        <p:txBody>
+          <a:bodyPr wrap="square" rtlCol="0">
+            <a:spAutoFit/>
+          </a:bodyPr>
+          <a:lstStyle/>
+          <a:p>
+            <a:r>
+              <a:rPr lang="en-US" sz="950" b="1" dirty="0">
+                <a:latin typeface="Arial" panose="020B0604020202020204" pitchFamily="34" charset="0"/>
+                <a:cs typeface="Arial" panose="020B0604020202020204" pitchFamily="34" charset="0"/>
+              </a:rPr>
+              <a:t>R/m</a:t>
+            </a:r>
+            <a:r>
+              <a:rPr lang="en-US" sz="950" b="1" baseline="30000" dirty="0">
+                <a:latin typeface="Arial" panose="020B0604020202020204" pitchFamily="34" charset="0"/>
+                <a:cs typeface="Arial" panose="020B0604020202020204" pitchFamily="34" charset="0"/>
+              </a:rPr>
+              <a:t>2</a:t>
+            </a:r>
+          </a:p>
+        </p:txBody>
+      </p:sp>
+      <p:pic>
+        <p:nvPicPr>
+          <p:cNvPr id="7" name="Picture 6">
+            <a:extLst>
+              <a:ext uri="{FF2B5EF4-FFF2-40B4-BE49-F238E27FC236}">
+                <a16:creationId xmlns:a16="http://schemas.microsoft.com/office/drawing/2014/main" id="{0F8C1423-AF9C-0B40-8F12-DB5901746B25}"/>
+              </a:ext>
+            </a:extLst>
+          </p:cNvPr>
+          <p:cNvPicPr>
+            <a:picLocks noChangeAspect="1"/>
+          </p:cNvPicPr>
+          <p:nvPr/>
+        </p:nvPicPr>
+        <p:blipFill>
+          <a:blip r:embed="rId3"/>
+          <a:stretch>
+            <a:fillRect/>
+          </a:stretch>
+        </p:blipFill>
+        <p:spPr>
+          <a:xfrm>
+            <a:off x="2153088" y="5701057"/>
+            <a:ext cx="3872574" cy="745603"/>
+          </a:xfrm>
+          <a:prstGeom prst="rect">
+            <a:avLst/>
+          </a:prstGeom>
+        </p:spPr>
+      </p:pic>
+      <p:sp>
+        <p:nvSpPr>
+          <p:cNvPr id="9" name="TextBox 8">
+            <a:extLst>
+              <a:ext uri="{FF2B5EF4-FFF2-40B4-BE49-F238E27FC236}">
+                <a16:creationId xmlns:a16="http://schemas.microsoft.com/office/drawing/2014/main" id="{A5B2138C-69A3-EB47-8143-A4FF8DE023E3}"/>
+              </a:ext>
+            </a:extLst>
+          </p:cNvPr>
+          <p:cNvSpPr txBox="1"/>
+          <p:nvPr/>
+        </p:nvSpPr>
+        <p:spPr>
+          <a:xfrm>
+            <a:off x="10021700" y="4114010"/>
+            <a:ext cx="630425" cy="238527"/>
+          </a:xfrm>
+          <a:prstGeom prst="rect">
+            <a:avLst/>
+          </a:prstGeom>
+          <a:noFill/>
+        </p:spPr>
+        <p:txBody>
+          <a:bodyPr wrap="square" rtlCol="0">
+            <a:spAutoFit/>
+          </a:bodyPr>
+          <a:lstStyle/>
+          <a:p>
+            <a:r>
+              <a:rPr lang="en-US" sz="950" b="1" dirty="0">
+                <a:latin typeface="Arial" panose="020B0604020202020204" pitchFamily="34" charset="0"/>
+                <a:cs typeface="Arial" panose="020B0604020202020204" pitchFamily="34" charset="0"/>
+              </a:rPr>
+              <a:t>Nup/m</a:t>
+            </a:r>
+            <a:r>
+              <a:rPr lang="en-US" sz="950" b="1" baseline="30000" dirty="0">
+                <a:latin typeface="Arial" panose="020B0604020202020204" pitchFamily="34" charset="0"/>
+                <a:cs typeface="Arial" panose="020B0604020202020204" pitchFamily="34" charset="0"/>
+              </a:rPr>
+              <a:t>2</a:t>
+            </a:r>
+          </a:p>
+        </p:txBody>
+      </p:sp>
+      <p:sp>
+        <p:nvSpPr>
+          <p:cNvPr id="14" name="Rectangle 13">
+            <a:extLst>
+              <a:ext uri="{FF2B5EF4-FFF2-40B4-BE49-F238E27FC236}">
+                <a16:creationId xmlns:a16="http://schemas.microsoft.com/office/drawing/2014/main" id="{3474466B-0349-AF4C-9D52-98DA60D51703}"/>
+              </a:ext>
+            </a:extLst>
+          </p:cNvPr>
+          <p:cNvSpPr/>
+          <p:nvPr/>
+        </p:nvSpPr>
+        <p:spPr>
+          <a:xfrm>
+            <a:off x="9892703" y="4913660"/>
+            <a:ext cx="695922" cy="133350"/>
+          </a:xfrm>
+          <a:prstGeom prst="rect">
+            <a:avLst/>
+          </a:prstGeom>
+          <a:solidFill>
+            <a:schemeClr val="bg1"/>
+          </a:solidFill>
+          <a:ln>
+            <a:noFill/>
+          </a:ln>
+        </p:spPr>
+        <p:style>
+          <a:lnRef idx="2">
+            <a:schemeClr val="accent1">
+              <a:shade val="50000"/>
+            </a:schemeClr>
+          </a:lnRef>
+          <a:fillRef idx="1">
+            <a:schemeClr val="accent1"/>
+          </a:fillRef>
+          <a:effectRef idx="0">
+            <a:schemeClr val="accent1"/>
+          </a:effectRef>
+          <a:fontRef idx="minor">
+            <a:schemeClr val="lt1"/>
+          </a:fontRef>
+        </p:style>
+        <p:txBody>
+          <a:bodyPr rtlCol="0" anchor="ctr"/>
+          <a:lstStyle/>
+          <a:p>
+            <a:pPr algn="ctr"/>
+            <a:endParaRPr lang="en-US"/>
+          </a:p>
+        </p:txBody>
+      </p:sp>
+      <p:sp>
+        <p:nvSpPr>
+          <p:cNvPr id="13" name="TextBox 12">
+            <a:extLst>
+              <a:ext uri="{FF2B5EF4-FFF2-40B4-BE49-F238E27FC236}">
+                <a16:creationId xmlns:a16="http://schemas.microsoft.com/office/drawing/2014/main" id="{F84CF3D0-0F0C-AE4D-8943-7BC433D4F642}"/>
+              </a:ext>
+            </a:extLst>
+          </p:cNvPr>
+          <p:cNvSpPr txBox="1"/>
+          <p:nvPr/>
+        </p:nvSpPr>
+        <p:spPr>
+          <a:xfrm>
+            <a:off x="9805100" y="4876095"/>
+            <a:ext cx="1008250" cy="246221"/>
+          </a:xfrm>
+          <a:prstGeom prst="rect">
+            <a:avLst/>
+          </a:prstGeom>
+          <a:noFill/>
+        </p:spPr>
+        <p:txBody>
+          <a:bodyPr wrap="square" rtlCol="0">
+            <a:spAutoFit/>
+          </a:bodyPr>
+          <a:lstStyle/>
+          <a:p>
+            <a:r>
+              <a:rPr lang="en-US" sz="950" b="1" i="1" dirty="0">
+                <a:solidFill>
+                  <a:srgbClr val="228B22"/>
+                </a:solidFill>
+                <a:latin typeface="Arial" panose="020B0604020202020204" pitchFamily="34" charset="0"/>
+                <a:cs typeface="Arial" panose="020B0604020202020204" pitchFamily="34" charset="0"/>
+              </a:rPr>
+              <a:t>biomass/m</a:t>
+            </a:r>
+            <a:r>
+              <a:rPr lang="en-US" sz="950" b="1" i="1" baseline="30000" dirty="0">
+                <a:solidFill>
+                  <a:srgbClr val="228B22"/>
+                </a:solidFill>
+                <a:latin typeface="Arial" panose="020B0604020202020204" pitchFamily="34" charset="0"/>
+                <a:cs typeface="Arial" panose="020B0604020202020204" pitchFamily="34" charset="0"/>
+              </a:rPr>
+              <a:t>2</a:t>
+            </a:r>
+          </a:p>
+        </p:txBody>
+      </p:sp>
+      <p:pic>
+        <p:nvPicPr>
+          <p:cNvPr id="15" name="Picture 14">
+            <a:extLst>
+              <a:ext uri="{FF2B5EF4-FFF2-40B4-BE49-F238E27FC236}">
+                <a16:creationId xmlns:a16="http://schemas.microsoft.com/office/drawing/2014/main" id="{2203EB60-9497-B048-8EA2-3114E4DC4E8F}"/>
+              </a:ext>
+            </a:extLst>
+          </p:cNvPr>
+          <p:cNvPicPr>
+            <a:picLocks noChangeAspect="1"/>
+          </p:cNvPicPr>
+          <p:nvPr/>
+        </p:nvPicPr>
+        <p:blipFill>
+          <a:blip r:embed="rId4"/>
+          <a:stretch>
+            <a:fillRect/>
+          </a:stretch>
+        </p:blipFill>
+        <p:spPr>
+          <a:xfrm>
+            <a:off x="2153088" y="5683471"/>
+            <a:ext cx="1759530" cy="177372"/>
+          </a:xfrm>
+          <a:prstGeom prst="rect">
+            <a:avLst/>
+          </a:prstGeom>
+        </p:spPr>
+      </p:pic>
+    </p:spTree>
+    <p:extLst>
+      <p:ext uri="{BB962C8B-B14F-4D97-AF65-F5344CB8AC3E}">
+        <p14:creationId xmlns:p14="http://schemas.microsoft.com/office/powerpoint/2010/main" val="826236397"/>
+      </p:ext>
+    </p:extLst>
+  </p:cSld>
+  <p:clrMapOvr>
+    <a:masterClrMapping/>
+  </p:clrMapOvr>
+</p:sld>
+</file>
+
+<file path=ppt/slides/slide3.xml><?xml version="1.0" encoding="utf-8"?>
 <p:sld xmlns:a="http://schemas.openxmlformats.org/drawingml/2006/main" xmlns:r="http://schemas.openxmlformats.org/officeDocument/2006/relationships" xmlns:p="http://schemas.openxmlformats.org/presentationml/2006/main">
   <p:cSld>
     <p:spTree>

</xml_diff>